<commit_message>
Cleaning up lecture #01 slides for CS235.
</commit_message>
<xml_diff>
--- a/Lectures/CS235 - UI Design - Lecture #01 - 2015.01.22.pptx
+++ b/Lectures/CS235 - UI Design - Lecture #01 - 2015.01.22.pptx
@@ -253,7 +253,8 @@
           <a:p>
             <a:fld id="{D4172681-C581-F644-AAF5-C092E01AA013}" type="datetimeFigureOut">
               <a:rPr lang="en-US" smtClean="0"/>
-              <a:t>1/22/15</a:t>
+              <a:pPr/>
+              <a:t>3/15/2015</a:t>
             </a:fld>
             <a:endParaRPr lang="en-US"/>
           </a:p>
@@ -319,6 +320,7 @@
           <a:p>
             <a:fld id="{C2A581D9-7090-374C-A542-C325CF1D3FFC}" type="slidenum">
               <a:rPr lang="en-US" smtClean="0"/>
+              <a:pPr/>
               <a:t>‹#›</a:t>
             </a:fld>
             <a:endParaRPr lang="en-US"/>
@@ -328,7 +330,7 @@
     </p:spTree>
     <p:extLst>
       <p:ext uri="{BB962C8B-B14F-4D97-AF65-F5344CB8AC3E}">
-        <p14:creationId xmlns:p14="http://schemas.microsoft.com/office/powerpoint/2010/main" val="2257200665"/>
+        <p14:creationId xmlns:p14="http://schemas.microsoft.com/office/powerpoint/2010/main" xmlns="" val="2257200665"/>
       </p:ext>
     </p:extLst>
   </p:cSld>
@@ -387,14 +389,14 @@
           <a:effectLst/>
           <a:extLst>
             <a:ext uri="{909E8E84-426E-40dd-AFC4-6F175D3DCCD1}">
-              <a14:hiddenFill xmlns:a14="http://schemas.microsoft.com/office/drawing/2010/main">
+              <a14:hiddenFill xmlns:a14="http://schemas.microsoft.com/office/drawing/2010/main" xmlns="">
                 <a:solidFill>
                   <a:schemeClr val="accent1"/>
                 </a:solidFill>
               </a14:hiddenFill>
             </a:ext>
             <a:ext uri="{91240B29-F687-4f45-9708-019B960494DF}">
-              <a14:hiddenLine xmlns:a14="http://schemas.microsoft.com/office/drawing/2010/main" w="9525">
+              <a14:hiddenLine xmlns:a14="http://schemas.microsoft.com/office/drawing/2010/main" xmlns="" w="9525">
                 <a:solidFill>
                   <a:schemeClr val="tx1"/>
                 </a:solidFill>
@@ -404,7 +406,7 @@
               </a14:hiddenLine>
             </a:ext>
             <a:ext uri="{AF507438-7753-43e0-B8FC-AC1667EBCBE1}">
-              <a14:hiddenEffects xmlns:a14="http://schemas.microsoft.com/office/drawing/2010/main">
+              <a14:hiddenEffects xmlns:a14="http://schemas.microsoft.com/office/drawing/2010/main" xmlns="">
                 <a:effectLst>
                   <a:outerShdw blurRad="63500" dist="38099" dir="2700000" algn="ctr" rotWithShape="0">
                     <a:schemeClr val="bg2">
@@ -415,7 +417,7 @@
               </a14:hiddenEffects>
             </a:ext>
             <a:ext uri="{FAA26D3D-D897-4be2-8F04-BA451C77F1D7}">
-              <ma14:placeholderFlag xmlns:ma14="http://schemas.microsoft.com/office/mac/drawingml/2011/main" val="1"/>
+              <ma14:placeholderFlag xmlns:ma14="http://schemas.microsoft.com/office/mac/drawingml/2011/main" xmlns="" val="1"/>
             </a:ext>
           </a:extLst>
         </p:spPr>
@@ -460,14 +462,14 @@
           <a:effectLst/>
           <a:extLst>
             <a:ext uri="{909E8E84-426E-40dd-AFC4-6F175D3DCCD1}">
-              <a14:hiddenFill xmlns:a14="http://schemas.microsoft.com/office/drawing/2010/main">
+              <a14:hiddenFill xmlns:a14="http://schemas.microsoft.com/office/drawing/2010/main" xmlns="">
                 <a:solidFill>
                   <a:schemeClr val="accent1"/>
                 </a:solidFill>
               </a14:hiddenFill>
             </a:ext>
             <a:ext uri="{91240B29-F687-4f45-9708-019B960494DF}">
-              <a14:hiddenLine xmlns:a14="http://schemas.microsoft.com/office/drawing/2010/main" w="9525">
+              <a14:hiddenLine xmlns:a14="http://schemas.microsoft.com/office/drawing/2010/main" xmlns="" w="9525">
                 <a:solidFill>
                   <a:schemeClr val="tx1"/>
                 </a:solidFill>
@@ -477,7 +479,7 @@
               </a14:hiddenLine>
             </a:ext>
             <a:ext uri="{AF507438-7753-43e0-B8FC-AC1667EBCBE1}">
-              <a14:hiddenEffects xmlns:a14="http://schemas.microsoft.com/office/drawing/2010/main">
+              <a14:hiddenEffects xmlns:a14="http://schemas.microsoft.com/office/drawing/2010/main" xmlns="">
                 <a:effectLst>
                   <a:outerShdw blurRad="63500" dist="38099" dir="2700000" algn="ctr" rotWithShape="0">
                     <a:schemeClr val="bg2">
@@ -488,7 +490,7 @@
               </a14:hiddenEffects>
             </a:ext>
             <a:ext uri="{FAA26D3D-D897-4be2-8F04-BA451C77F1D7}">
-              <ma14:placeholderFlag xmlns:ma14="http://schemas.microsoft.com/office/mac/drawingml/2011/main" val="1"/>
+              <ma14:placeholderFlag xmlns:ma14="http://schemas.microsoft.com/office/mac/drawingml/2011/main" xmlns="" val="1"/>
             </a:ext>
           </a:extLst>
         </p:spPr>
@@ -538,7 +540,7 @@
           <a:effectLst/>
           <a:extLst>
             <a:ext uri="{AF507438-7753-43e0-B8FC-AC1667EBCBE1}">
-              <a14:hiddenEffects xmlns:a14="http://schemas.microsoft.com/office/drawing/2010/main">
+              <a14:hiddenEffects xmlns:a14="http://schemas.microsoft.com/office/drawing/2010/main" xmlns="">
                 <a:effectLst>
                   <a:outerShdw blurRad="63500" dist="38099" dir="2700000" algn="ctr" rotWithShape="0">
                     <a:srgbClr val="000000">
@@ -549,7 +551,7 @@
               </a14:hiddenEffects>
             </a:ext>
             <a:ext uri="{53640926-AAD7-44d8-BBD7-CCE9431645EC}">
-              <a14:shadowObscured xmlns:a14="http://schemas.microsoft.com/office/drawing/2010/main" val="1"/>
+              <a14:shadowObscured xmlns:a14="http://schemas.microsoft.com/office/drawing/2010/main" xmlns="" val="1"/>
             </a:ext>
           </a:extLst>
         </p:spPr>
@@ -579,14 +581,14 @@
           <a:effectLst/>
           <a:extLst>
             <a:ext uri="{909E8E84-426E-40dd-AFC4-6F175D3DCCD1}">
-              <a14:hiddenFill xmlns:a14="http://schemas.microsoft.com/office/drawing/2010/main">
+              <a14:hiddenFill xmlns:a14="http://schemas.microsoft.com/office/drawing/2010/main" xmlns="">
                 <a:solidFill>
                   <a:schemeClr val="accent1"/>
                 </a:solidFill>
               </a14:hiddenFill>
             </a:ext>
             <a:ext uri="{91240B29-F687-4f45-9708-019B960494DF}">
-              <a14:hiddenLine xmlns:a14="http://schemas.microsoft.com/office/drawing/2010/main" w="9525">
+              <a14:hiddenLine xmlns:a14="http://schemas.microsoft.com/office/drawing/2010/main" xmlns="" w="9525">
                 <a:solidFill>
                   <a:schemeClr val="tx1"/>
                 </a:solidFill>
@@ -596,7 +598,7 @@
               </a14:hiddenLine>
             </a:ext>
             <a:ext uri="{AF507438-7753-43e0-B8FC-AC1667EBCBE1}">
-              <a14:hiddenEffects xmlns:a14="http://schemas.microsoft.com/office/drawing/2010/main">
+              <a14:hiddenEffects xmlns:a14="http://schemas.microsoft.com/office/drawing/2010/main" xmlns="">
                 <a:effectLst>
                   <a:outerShdw blurRad="63500" dist="38099" dir="2700000" algn="ctr" rotWithShape="0">
                     <a:schemeClr val="bg2">
@@ -607,7 +609,7 @@
               </a14:hiddenEffects>
             </a:ext>
             <a:ext uri="{FAA26D3D-D897-4be2-8F04-BA451C77F1D7}">
-              <ma14:placeholderFlag xmlns:ma14="http://schemas.microsoft.com/office/mac/drawingml/2011/main" val="1"/>
+              <ma14:placeholderFlag xmlns:ma14="http://schemas.microsoft.com/office/mac/drawingml/2011/main" xmlns="" val="1"/>
             </a:ext>
           </a:extLst>
         </p:spPr>
@@ -680,14 +682,14 @@
           <a:effectLst/>
           <a:extLst>
             <a:ext uri="{909E8E84-426E-40dd-AFC4-6F175D3DCCD1}">
-              <a14:hiddenFill xmlns:a14="http://schemas.microsoft.com/office/drawing/2010/main">
+              <a14:hiddenFill xmlns:a14="http://schemas.microsoft.com/office/drawing/2010/main" xmlns="">
                 <a:solidFill>
                   <a:schemeClr val="accent1"/>
                 </a:solidFill>
               </a14:hiddenFill>
             </a:ext>
             <a:ext uri="{91240B29-F687-4f45-9708-019B960494DF}">
-              <a14:hiddenLine xmlns:a14="http://schemas.microsoft.com/office/drawing/2010/main" w="9525">
+              <a14:hiddenLine xmlns:a14="http://schemas.microsoft.com/office/drawing/2010/main" xmlns="" w="9525">
                 <a:solidFill>
                   <a:schemeClr val="tx1"/>
                 </a:solidFill>
@@ -697,7 +699,7 @@
               </a14:hiddenLine>
             </a:ext>
             <a:ext uri="{AF507438-7753-43e0-B8FC-AC1667EBCBE1}">
-              <a14:hiddenEffects xmlns:a14="http://schemas.microsoft.com/office/drawing/2010/main">
+              <a14:hiddenEffects xmlns:a14="http://schemas.microsoft.com/office/drawing/2010/main" xmlns="">
                 <a:effectLst>
                   <a:outerShdw blurRad="63500" dist="38099" dir="2700000" algn="ctr" rotWithShape="0">
                     <a:schemeClr val="bg2">
@@ -708,7 +710,7 @@
               </a14:hiddenEffects>
             </a:ext>
             <a:ext uri="{FAA26D3D-D897-4be2-8F04-BA451C77F1D7}">
-              <ma14:placeholderFlag xmlns:ma14="http://schemas.microsoft.com/office/mac/drawingml/2011/main" val="1"/>
+              <ma14:placeholderFlag xmlns:ma14="http://schemas.microsoft.com/office/mac/drawingml/2011/main" xmlns="" val="1"/>
             </a:ext>
           </a:extLst>
         </p:spPr>
@@ -753,14 +755,14 @@
           <a:effectLst/>
           <a:extLst>
             <a:ext uri="{909E8E84-426E-40dd-AFC4-6F175D3DCCD1}">
-              <a14:hiddenFill xmlns:a14="http://schemas.microsoft.com/office/drawing/2010/main">
+              <a14:hiddenFill xmlns:a14="http://schemas.microsoft.com/office/drawing/2010/main" xmlns="">
                 <a:solidFill>
                   <a:schemeClr val="accent1"/>
                 </a:solidFill>
               </a14:hiddenFill>
             </a:ext>
             <a:ext uri="{91240B29-F687-4f45-9708-019B960494DF}">
-              <a14:hiddenLine xmlns:a14="http://schemas.microsoft.com/office/drawing/2010/main" w="9525">
+              <a14:hiddenLine xmlns:a14="http://schemas.microsoft.com/office/drawing/2010/main" xmlns="" w="9525">
                 <a:solidFill>
                   <a:schemeClr val="tx1"/>
                 </a:solidFill>
@@ -770,7 +772,7 @@
               </a14:hiddenLine>
             </a:ext>
             <a:ext uri="{AF507438-7753-43e0-B8FC-AC1667EBCBE1}">
-              <a14:hiddenEffects xmlns:a14="http://schemas.microsoft.com/office/drawing/2010/main">
+              <a14:hiddenEffects xmlns:a14="http://schemas.microsoft.com/office/drawing/2010/main" xmlns="">
                 <a:effectLst>
                   <a:outerShdw blurRad="63500" dist="38099" dir="2700000" algn="ctr" rotWithShape="0">
                     <a:schemeClr val="bg2">
@@ -781,7 +783,7 @@
               </a14:hiddenEffects>
             </a:ext>
             <a:ext uri="{FAA26D3D-D897-4be2-8F04-BA451C77F1D7}">
-              <ma14:placeholderFlag xmlns:ma14="http://schemas.microsoft.com/office/mac/drawingml/2011/main" val="1"/>
+              <ma14:placeholderFlag xmlns:ma14="http://schemas.microsoft.com/office/mac/drawingml/2011/main" xmlns="" val="1"/>
             </a:ext>
           </a:extLst>
         </p:spPr>
@@ -809,7 +811,7 @@
     </p:spTree>
     <p:extLst>
       <p:ext uri="{BB962C8B-B14F-4D97-AF65-F5344CB8AC3E}">
-        <p14:creationId xmlns:p14="http://schemas.microsoft.com/office/powerpoint/2010/main" val="2181768727"/>
+        <p14:creationId xmlns:p14="http://schemas.microsoft.com/office/powerpoint/2010/main" xmlns="" val="2181768727"/>
       </p:ext>
     </p:extLst>
   </p:cSld>
@@ -982,7 +984,7 @@
           <a:effectLst/>
           <a:extLst>
             <a:ext uri="{91240B29-F687-4f45-9708-019B960494DF}">
-              <a14:hiddenLine xmlns:a14="http://schemas.microsoft.com/office/drawing/2010/main" w="12700">
+              <a14:hiddenLine xmlns:a14="http://schemas.microsoft.com/office/drawing/2010/main" xmlns="" w="12700">
                 <a:solidFill>
                   <a:schemeClr val="tx1"/>
                 </a:solidFill>
@@ -992,7 +994,7 @@
               </a14:hiddenLine>
             </a:ext>
             <a:ext uri="{AF507438-7753-43e0-B8FC-AC1667EBCBE1}">
-              <a14:hiddenEffects xmlns:a14="http://schemas.microsoft.com/office/drawing/2010/main">
+              <a14:hiddenEffects xmlns:a14="http://schemas.microsoft.com/office/drawing/2010/main" xmlns="">
                 <a:effectLst>
                   <a:outerShdw blurRad="63500" dist="38099" dir="2700000" algn="ctr" rotWithShape="0">
                     <a:schemeClr val="bg2">
@@ -1127,7 +1129,7 @@
             <a:effectLst/>
             <a:extLst>
               <a:ext uri="{AF507438-7753-43e0-B8FC-AC1667EBCBE1}">
-                <a14:hiddenEffects xmlns:a14="http://schemas.microsoft.com/office/drawing/2010/main">
+                <a14:hiddenEffects xmlns:a14="http://schemas.microsoft.com/office/drawing/2010/main" xmlns="">
                   <a:effectLst>
                     <a:outerShdw blurRad="63500" dist="38099" dir="2700000" algn="ctr" rotWithShape="0">
                       <a:schemeClr val="bg2">
@@ -1180,7 +1182,7 @@
             <a:effectLst/>
             <a:extLst>
               <a:ext uri="{AF507438-7753-43e0-B8FC-AC1667EBCBE1}">
-                <a14:hiddenEffects xmlns:a14="http://schemas.microsoft.com/office/drawing/2010/main">
+                <a14:hiddenEffects xmlns:a14="http://schemas.microsoft.com/office/drawing/2010/main" xmlns="">
                   <a:effectLst>
                     <a:outerShdw blurRad="63500" dist="38099" dir="2700000" algn="ctr" rotWithShape="0">
                       <a:schemeClr val="bg2">
@@ -1233,7 +1235,7 @@
             <a:effectLst/>
             <a:extLst>
               <a:ext uri="{AF507438-7753-43e0-B8FC-AC1667EBCBE1}">
-                <a14:hiddenEffects xmlns:a14="http://schemas.microsoft.com/office/drawing/2010/main">
+                <a14:hiddenEffects xmlns:a14="http://schemas.microsoft.com/office/drawing/2010/main" xmlns="">
                   <a:effectLst>
                     <a:outerShdw blurRad="63500" dist="38099" dir="2700000" algn="ctr" rotWithShape="0">
                       <a:schemeClr val="bg2">
@@ -1286,7 +1288,7 @@
             <a:effectLst/>
             <a:extLst>
               <a:ext uri="{AF507438-7753-43e0-B8FC-AC1667EBCBE1}">
-                <a14:hiddenEffects xmlns:a14="http://schemas.microsoft.com/office/drawing/2010/main">
+                <a14:hiddenEffects xmlns:a14="http://schemas.microsoft.com/office/drawing/2010/main" xmlns="">
                   <a:effectLst>
                     <a:outerShdw blurRad="63500" dist="38099" dir="2700000" algn="ctr" rotWithShape="0">
                       <a:schemeClr val="bg2">
@@ -1337,12 +1339,12 @@
             <a:effectLst/>
             <a:extLst>
               <a:ext uri="{909E8E84-426E-40dd-AFC4-6F175D3DCCD1}">
-                <a14:hiddenFill xmlns:a14="http://schemas.microsoft.com/office/drawing/2010/main">
+                <a14:hiddenFill xmlns:a14="http://schemas.microsoft.com/office/drawing/2010/main" xmlns="">
                   <a:noFill/>
                 </a14:hiddenFill>
               </a:ext>
               <a:ext uri="{AF507438-7753-43e0-B8FC-AC1667EBCBE1}">
-                <a14:hiddenEffects xmlns:a14="http://schemas.microsoft.com/office/drawing/2010/main">
+                <a14:hiddenEffects xmlns:a14="http://schemas.microsoft.com/office/drawing/2010/main" xmlns="">
                   <a:effectLst>
                     <a:outerShdw blurRad="63500" dist="38099" dir="2700000" algn="ctr" rotWithShape="0">
                       <a:schemeClr val="bg2">
@@ -1390,14 +1392,14 @@
             <a:effectLst/>
             <a:extLst>
               <a:ext uri="{909E8E84-426E-40dd-AFC4-6F175D3DCCD1}">
-                <a14:hiddenFill xmlns:a14="http://schemas.microsoft.com/office/drawing/2010/main">
+                <a14:hiddenFill xmlns:a14="http://schemas.microsoft.com/office/drawing/2010/main" xmlns="">
                   <a:solidFill>
                     <a:schemeClr val="accent1"/>
                   </a:solidFill>
                 </a14:hiddenFill>
               </a:ext>
               <a:ext uri="{AF507438-7753-43e0-B8FC-AC1667EBCBE1}">
-                <a14:hiddenEffects xmlns:a14="http://schemas.microsoft.com/office/drawing/2010/main">
+                <a14:hiddenEffects xmlns:a14="http://schemas.microsoft.com/office/drawing/2010/main" xmlns="">
                   <a:effectLst>
                     <a:outerShdw blurRad="63500" dist="38099" dir="2700000" algn="ctr" rotWithShape="0">
                       <a:schemeClr val="bg2">
@@ -1429,7 +1431,7 @@
   <p:timing>
     <p:tnLst>
       <p:par>
-        <p:cTn xmlns:p14="http://schemas.microsoft.com/office/powerpoint/2010/main" id="1" dur="indefinite" restart="never" nodeType="tmRoot"/>
+        <p:cTn id="1" dur="indefinite" restart="never" nodeType="tmRoot"/>
       </p:par>
     </p:tnLst>
   </p:timing>
@@ -1559,7 +1561,7 @@
     </p:spTree>
     <p:extLst>
       <p:ext uri="{BB962C8B-B14F-4D97-AF65-F5344CB8AC3E}">
-        <p14:creationId xmlns:p14="http://schemas.microsoft.com/office/powerpoint/2010/main" val="2277753422"/>
+        <p14:creationId xmlns:p14="http://schemas.microsoft.com/office/powerpoint/2010/main" xmlns="" val="2277753422"/>
       </p:ext>
     </p:extLst>
   </p:cSld>
@@ -1619,14 +1621,14 @@
           <a:effectLst/>
           <a:extLst>
             <a:ext uri="{909E8E84-426E-40dd-AFC4-6F175D3DCCD1}">
-              <a14:hiddenFill xmlns:a14="http://schemas.microsoft.com/office/drawing/2010/main">
+              <a14:hiddenFill xmlns:a14="http://schemas.microsoft.com/office/drawing/2010/main" xmlns="">
                 <a:solidFill>
                   <a:schemeClr val="accent1"/>
                 </a:solidFill>
               </a14:hiddenFill>
             </a:ext>
             <a:ext uri="{91240B29-F687-4f45-9708-019B960494DF}">
-              <a14:hiddenLine xmlns:a14="http://schemas.microsoft.com/office/drawing/2010/main" w="9525">
+              <a14:hiddenLine xmlns:a14="http://schemas.microsoft.com/office/drawing/2010/main" xmlns="" w="9525">
                 <a:solidFill>
                   <a:schemeClr val="tx1"/>
                 </a:solidFill>
@@ -1636,7 +1638,7 @@
               </a14:hiddenLine>
             </a:ext>
             <a:ext uri="{AF507438-7753-43e0-B8FC-AC1667EBCBE1}">
-              <a14:hiddenEffects xmlns:a14="http://schemas.microsoft.com/office/drawing/2010/main">
+              <a14:hiddenEffects xmlns:a14="http://schemas.microsoft.com/office/drawing/2010/main" xmlns="">
                 <a:effectLst>
                   <a:outerShdw blurRad="63500" dist="38099" dir="2700000" algn="ctr" rotWithShape="0">
                     <a:schemeClr val="bg2">
@@ -1647,7 +1649,7 @@
               </a14:hiddenEffects>
             </a:ext>
             <a:ext uri="{FAA26D3D-D897-4be2-8F04-BA451C77F1D7}">
-              <ma14:placeholderFlag xmlns:ma14="http://schemas.microsoft.com/office/mac/drawingml/2011/main" val="1"/>
+              <ma14:placeholderFlag xmlns:ma14="http://schemas.microsoft.com/office/mac/drawingml/2011/main" xmlns="" val="1"/>
             </a:ext>
           </a:extLst>
         </p:spPr>
@@ -1692,14 +1694,14 @@
           <a:effectLst/>
           <a:extLst>
             <a:ext uri="{909E8E84-426E-40dd-AFC4-6F175D3DCCD1}">
-              <a14:hiddenFill xmlns:a14="http://schemas.microsoft.com/office/drawing/2010/main">
+              <a14:hiddenFill xmlns:a14="http://schemas.microsoft.com/office/drawing/2010/main" xmlns="">
                 <a:solidFill>
                   <a:schemeClr val="accent1"/>
                 </a:solidFill>
               </a14:hiddenFill>
             </a:ext>
             <a:ext uri="{91240B29-F687-4f45-9708-019B960494DF}">
-              <a14:hiddenLine xmlns:a14="http://schemas.microsoft.com/office/drawing/2010/main" w="9525">
+              <a14:hiddenLine xmlns:a14="http://schemas.microsoft.com/office/drawing/2010/main" xmlns="" w="9525">
                 <a:solidFill>
                   <a:schemeClr val="tx1"/>
                 </a:solidFill>
@@ -1709,7 +1711,7 @@
               </a14:hiddenLine>
             </a:ext>
             <a:ext uri="{AF507438-7753-43e0-B8FC-AC1667EBCBE1}">
-              <a14:hiddenEffects xmlns:a14="http://schemas.microsoft.com/office/drawing/2010/main">
+              <a14:hiddenEffects xmlns:a14="http://schemas.microsoft.com/office/drawing/2010/main" xmlns="">
                 <a:effectLst>
                   <a:outerShdw blurRad="63500" dist="38099" dir="2700000" algn="ctr" rotWithShape="0">
                     <a:schemeClr val="bg2">
@@ -1720,7 +1722,7 @@
               </a14:hiddenEffects>
             </a:ext>
             <a:ext uri="{FAA26D3D-D897-4be2-8F04-BA451C77F1D7}">
-              <ma14:placeholderFlag xmlns:ma14="http://schemas.microsoft.com/office/mac/drawingml/2011/main" val="1"/>
+              <ma14:placeholderFlag xmlns:ma14="http://schemas.microsoft.com/office/mac/drawingml/2011/main" xmlns="" val="1"/>
             </a:ext>
           </a:extLst>
         </p:spPr>
@@ -1793,14 +1795,14 @@
           <a:effectLst/>
           <a:extLst>
             <a:ext uri="{909E8E84-426E-40dd-AFC4-6F175D3DCCD1}">
-              <a14:hiddenFill xmlns:a14="http://schemas.microsoft.com/office/drawing/2010/main">
+              <a14:hiddenFill xmlns:a14="http://schemas.microsoft.com/office/drawing/2010/main" xmlns="">
                 <a:solidFill>
                   <a:schemeClr val="accent1"/>
                 </a:solidFill>
               </a14:hiddenFill>
             </a:ext>
             <a:ext uri="{91240B29-F687-4f45-9708-019B960494DF}">
-              <a14:hiddenLine xmlns:a14="http://schemas.microsoft.com/office/drawing/2010/main" w="9525">
+              <a14:hiddenLine xmlns:a14="http://schemas.microsoft.com/office/drawing/2010/main" xmlns="" w="9525">
                 <a:solidFill>
                   <a:schemeClr val="tx1"/>
                 </a:solidFill>
@@ -1810,7 +1812,7 @@
               </a14:hiddenLine>
             </a:ext>
             <a:ext uri="{AF507438-7753-43e0-B8FC-AC1667EBCBE1}">
-              <a14:hiddenEffects xmlns:a14="http://schemas.microsoft.com/office/drawing/2010/main">
+              <a14:hiddenEffects xmlns:a14="http://schemas.microsoft.com/office/drawing/2010/main" xmlns="">
                 <a:effectLst>
                   <a:outerShdw blurRad="63500" dist="38099" dir="2700000" algn="ctr" rotWithShape="0">
                     <a:schemeClr val="bg2">
@@ -1821,7 +1823,7 @@
               </a14:hiddenEffects>
             </a:ext>
             <a:ext uri="{FAA26D3D-D897-4be2-8F04-BA451C77F1D7}">
-              <ma14:placeholderFlag xmlns:ma14="http://schemas.microsoft.com/office/mac/drawingml/2011/main" val="1"/>
+              <ma14:placeholderFlag xmlns:ma14="http://schemas.microsoft.com/office/mac/drawingml/2011/main" xmlns="" val="1"/>
             </a:ext>
           </a:extLst>
         </p:spPr>
@@ -1890,12 +1892,12 @@
             <a:effectLst/>
             <a:extLst>
               <a:ext uri="{909E8E84-426E-40dd-AFC4-6F175D3DCCD1}">
-                <a14:hiddenFill xmlns:a14="http://schemas.microsoft.com/office/drawing/2010/main">
+                <a14:hiddenFill xmlns:a14="http://schemas.microsoft.com/office/drawing/2010/main" xmlns="">
                   <a:noFill/>
                 </a14:hiddenFill>
               </a:ext>
               <a:ext uri="{AF507438-7753-43e0-B8FC-AC1667EBCBE1}">
-                <a14:hiddenEffects xmlns:a14="http://schemas.microsoft.com/office/drawing/2010/main">
+                <a14:hiddenEffects xmlns:a14="http://schemas.microsoft.com/office/drawing/2010/main" xmlns="">
                   <a:effectLst>
                     <a:outerShdw blurRad="63500" dist="38099" dir="2700000" algn="ctr" rotWithShape="0">
                       <a:schemeClr val="bg2">
@@ -1945,7 +1947,7 @@
             <a:effectLst/>
             <a:extLst>
               <a:ext uri="{AF507438-7753-43e0-B8FC-AC1667EBCBE1}">
-                <a14:hiddenEffects xmlns:a14="http://schemas.microsoft.com/office/drawing/2010/main">
+                <a14:hiddenEffects xmlns:a14="http://schemas.microsoft.com/office/drawing/2010/main" xmlns="">
                   <a:effectLst>
                     <a:outerShdw blurRad="63500" dist="38099" dir="2700000" algn="ctr" rotWithShape="0">
                       <a:schemeClr val="bg2">
@@ -1998,7 +2000,7 @@
             <a:effectLst/>
             <a:extLst>
               <a:ext uri="{AF507438-7753-43e0-B8FC-AC1667EBCBE1}">
-                <a14:hiddenEffects xmlns:a14="http://schemas.microsoft.com/office/drawing/2010/main">
+                <a14:hiddenEffects xmlns:a14="http://schemas.microsoft.com/office/drawing/2010/main" xmlns="">
                   <a:effectLst>
                     <a:outerShdw blurRad="63500" dist="38099" dir="2700000" algn="ctr" rotWithShape="0">
                       <a:schemeClr val="bg2">
@@ -2051,7 +2053,7 @@
             <a:effectLst/>
             <a:extLst>
               <a:ext uri="{AF507438-7753-43e0-B8FC-AC1667EBCBE1}">
-                <a14:hiddenEffects xmlns:a14="http://schemas.microsoft.com/office/drawing/2010/main">
+                <a14:hiddenEffects xmlns:a14="http://schemas.microsoft.com/office/drawing/2010/main" xmlns="">
                   <a:effectLst>
                     <a:outerShdw blurRad="63500" dist="38099" dir="2700000" algn="ctr" rotWithShape="0">
                       <a:schemeClr val="bg2">
@@ -2104,7 +2106,7 @@
             <a:effectLst/>
             <a:extLst>
               <a:ext uri="{AF507438-7753-43e0-B8FC-AC1667EBCBE1}">
-                <a14:hiddenEffects xmlns:a14="http://schemas.microsoft.com/office/drawing/2010/main">
+                <a14:hiddenEffects xmlns:a14="http://schemas.microsoft.com/office/drawing/2010/main" xmlns="">
                   <a:effectLst>
                     <a:outerShdw blurRad="63500" dist="38099" dir="2700000" algn="ctr" rotWithShape="0">
                       <a:schemeClr val="bg2">
@@ -2140,7 +2142,7 @@
           <a:blip r:embed="rId4">
             <a:extLst>
               <a:ext uri="{28A0092B-C50C-407E-A947-70E740481C1C}">
-                <a14:useLocalDpi xmlns:a14="http://schemas.microsoft.com/office/drawing/2010/main" val="0"/>
+                <a14:useLocalDpi xmlns:a14="http://schemas.microsoft.com/office/drawing/2010/main" xmlns="" val="0"/>
               </a:ext>
             </a:extLst>
           </a:blip>
@@ -2160,7 +2162,7 @@
           <a:noFill/>
           <a:extLst>
             <a:ext uri="{909E8E84-426E-40dd-AFC4-6F175D3DCCD1}">
-              <a14:hiddenFill xmlns:a14="http://schemas.microsoft.com/office/drawing/2010/main">
+              <a14:hiddenFill xmlns:a14="http://schemas.microsoft.com/office/drawing/2010/main" xmlns="">
                 <a:solidFill>
                   <a:srgbClr val="FFFFFF"/>
                 </a:solidFill>
@@ -2261,7 +2263,7 @@
   <p:timing>
     <p:tnLst>
       <p:par>
-        <p:cTn xmlns:p14="http://schemas.microsoft.com/office/powerpoint/2010/main" id="1" dur="indefinite" restart="never" nodeType="tmRoot"/>
+        <p:cTn id="1" dur="indefinite" restart="never" nodeType="tmRoot"/>
       </p:par>
     </p:tnLst>
   </p:timing>
@@ -2839,7 +2841,7 @@
           <a:blip r:embed="rId3">
             <a:extLst>
               <a:ext uri="{28A0092B-C50C-407E-A947-70E740481C1C}">
-                <a14:useLocalDpi xmlns:a14="http://schemas.microsoft.com/office/drawing/2010/main" val="0"/>
+                <a14:useLocalDpi xmlns:a14="http://schemas.microsoft.com/office/drawing/2010/main" xmlns="" val="0"/>
               </a:ext>
             </a:extLst>
           </a:blip>
@@ -2863,14 +2865,14 @@
           <a:effectLst/>
           <a:extLst>
             <a:ext uri="{909E8E84-426E-40dd-AFC4-6F175D3DCCD1}">
-              <a14:hiddenFill xmlns:a14="http://schemas.microsoft.com/office/drawing/2010/main">
+              <a14:hiddenFill xmlns:a14="http://schemas.microsoft.com/office/drawing/2010/main" xmlns="">
                 <a:solidFill>
                   <a:schemeClr val="accent1"/>
                 </a:solidFill>
               </a14:hiddenFill>
             </a:ext>
             <a:ext uri="{91240B29-F687-4f45-9708-019B960494DF}">
-              <a14:hiddenLine xmlns:a14="http://schemas.microsoft.com/office/drawing/2010/main" w="9525">
+              <a14:hiddenLine xmlns:a14="http://schemas.microsoft.com/office/drawing/2010/main" xmlns="" w="9525">
                 <a:solidFill>
                   <a:schemeClr val="tx1"/>
                 </a:solidFill>
@@ -2880,7 +2882,7 @@
               </a14:hiddenLine>
             </a:ext>
             <a:ext uri="{AF507438-7753-43e0-B8FC-AC1667EBCBE1}">
-              <a14:hiddenEffects xmlns:a14="http://schemas.microsoft.com/office/drawing/2010/main">
+              <a14:hiddenEffects xmlns:a14="http://schemas.microsoft.com/office/drawing/2010/main" xmlns="">
                 <a:effectLst>
                   <a:outerShdw blurRad="63500" dist="38099" dir="2700000" algn="ctr" rotWithShape="0">
                     <a:schemeClr val="bg2">
@@ -2905,7 +2907,7 @@
           <a:blip r:embed="rId4">
             <a:extLst>
               <a:ext uri="{28A0092B-C50C-407E-A947-70E740481C1C}">
-                <a14:useLocalDpi xmlns:a14="http://schemas.microsoft.com/office/drawing/2010/main" val="0"/>
+                <a14:useLocalDpi xmlns:a14="http://schemas.microsoft.com/office/drawing/2010/main" xmlns="" val="0"/>
               </a:ext>
             </a:extLst>
           </a:blip>
@@ -2925,7 +2927,7 @@
           <a:noFill/>
           <a:extLst>
             <a:ext uri="{909E8E84-426E-40dd-AFC4-6F175D3DCCD1}">
-              <a14:hiddenFill xmlns:a14="http://schemas.microsoft.com/office/drawing/2010/main">
+              <a14:hiddenFill xmlns:a14="http://schemas.microsoft.com/office/drawing/2010/main" xmlns="">
                 <a:solidFill>
                   <a:srgbClr val="FFFFFF"/>
                 </a:solidFill>
@@ -2942,7 +2944,7 @@
   <p:timing>
     <p:tnLst>
       <p:par>
-        <p:cTn xmlns:p14="http://schemas.microsoft.com/office/powerpoint/2010/main" id="1" dur="indefinite" restart="never" nodeType="tmRoot"/>
+        <p:cTn id="1" dur="indefinite" restart="never" nodeType="tmRoot"/>
       </p:par>
     </p:tnLst>
   </p:timing>
@@ -3080,7 +3082,7 @@
     </p:spTree>
     <p:extLst>
       <p:ext uri="{BB962C8B-B14F-4D97-AF65-F5344CB8AC3E}">
-        <p14:creationId xmlns:p14="http://schemas.microsoft.com/office/powerpoint/2010/main" val="4153945985"/>
+        <p14:creationId xmlns:p14="http://schemas.microsoft.com/office/powerpoint/2010/main" xmlns="" val="4153945985"/>
       </p:ext>
     </p:extLst>
   </p:cSld>
@@ -3090,7 +3092,7 @@
   <p:timing>
     <p:tnLst>
       <p:par>
-        <p:cTn xmlns:p14="http://schemas.microsoft.com/office/powerpoint/2010/main" id="1" dur="indefinite" restart="never" nodeType="tmRoot"/>
+        <p:cTn id="1" dur="indefinite" restart="never" nodeType="tmRoot"/>
       </p:par>
     </p:tnLst>
   </p:timing>
@@ -3185,14 +3187,14 @@
           <a:effectLst/>
           <a:extLst>
             <a:ext uri="{909E8E84-426E-40dd-AFC4-6F175D3DCCD1}">
-              <a14:hiddenFill xmlns:a14="http://schemas.microsoft.com/office/drawing/2010/main">
+              <a14:hiddenFill xmlns:a14="http://schemas.microsoft.com/office/drawing/2010/main" xmlns="">
                 <a:solidFill>
                   <a:schemeClr val="accent1"/>
                 </a:solidFill>
               </a14:hiddenFill>
             </a:ext>
             <a:ext uri="{AF507438-7753-43e0-B8FC-AC1667EBCBE1}">
-              <a14:hiddenEffects xmlns:a14="http://schemas.microsoft.com/office/drawing/2010/main">
+              <a14:hiddenEffects xmlns:a14="http://schemas.microsoft.com/office/drawing/2010/main" xmlns="">
                 <a:effectLst>
                   <a:outerShdw blurRad="63500" dist="38099" dir="2700000" algn="ctr" rotWithShape="0">
                     <a:schemeClr val="bg2">
@@ -3229,7 +3231,7 @@
   <p:timing>
     <p:tnLst>
       <p:par>
-        <p:cTn xmlns:p14="http://schemas.microsoft.com/office/powerpoint/2010/main" id="1" dur="indefinite" restart="never" nodeType="tmRoot"/>
+        <p:cTn id="1" dur="indefinite" restart="never" nodeType="tmRoot"/>
       </p:par>
     </p:tnLst>
   </p:timing>
@@ -3352,11 +3354,7 @@
             </a:r>
             <a:r>
               <a:rPr lang="en-US" dirty="0" smtClean="0"/>
-              <a:t> user interface</a:t>
-            </a:r>
-            <a:r>
-              <a:rPr lang="en-US" dirty="0" smtClean="0"/>
-              <a:t>?</a:t>
+              <a:t> user interface?</a:t>
             </a:r>
             <a:endParaRPr lang="en-US" dirty="0"/>
           </a:p>
@@ -3370,7 +3368,7 @@
   <p:timing>
     <p:tnLst>
       <p:par>
-        <p:cTn xmlns:p14="http://schemas.microsoft.com/office/powerpoint/2010/main" id="1" dur="indefinite" restart="never" nodeType="tmRoot"/>
+        <p:cTn id="1" dur="indefinite" restart="never" nodeType="tmRoot"/>
       </p:par>
     </p:tnLst>
   </p:timing>
@@ -3478,7 +3476,7 @@
           <p:nvPr>
             <p:extLst>
               <p:ext uri="{D42A27DB-BD31-4B8C-83A1-F6EECF244321}">
-                <p14:modId xmlns:p14="http://schemas.microsoft.com/office/powerpoint/2010/main" val="3981513527"/>
+                <p14:modId xmlns:p14="http://schemas.microsoft.com/office/powerpoint/2010/main" xmlns="" val="3981513527"/>
               </p:ext>
             </p:extLst>
           </p:nvPr>
@@ -4023,7 +4021,7 @@
     </p:spTree>
     <p:extLst>
       <p:ext uri="{BB962C8B-B14F-4D97-AF65-F5344CB8AC3E}">
-        <p14:creationId xmlns:p14="http://schemas.microsoft.com/office/powerpoint/2010/main" val="3917354268"/>
+        <p14:creationId xmlns:p14="http://schemas.microsoft.com/office/powerpoint/2010/main" xmlns="" val="3917354268"/>
       </p:ext>
     </p:extLst>
   </p:cSld>
@@ -4033,7 +4031,7 @@
   <p:timing>
     <p:tnLst>
       <p:par>
-        <p:cTn xmlns:p14="http://schemas.microsoft.com/office/powerpoint/2010/main" id="1" dur="indefinite" restart="never" nodeType="tmRoot">
+        <p:cTn id="1" dur="indefinite" restart="never" nodeType="tmRoot">
           <p:childTnLst>
             <p:seq concurrent="1" nextAc="seek">
               <p:cTn id="2" dur="indefinite" nodeType="mainSeq">
@@ -4289,7 +4287,7 @@
     </p:spTree>
     <p:extLst>
       <p:ext uri="{BB962C8B-B14F-4D97-AF65-F5344CB8AC3E}">
-        <p14:creationId xmlns:p14="http://schemas.microsoft.com/office/powerpoint/2010/main" val="3664398980"/>
+        <p14:creationId xmlns:p14="http://schemas.microsoft.com/office/powerpoint/2010/main" xmlns="" val="3664398980"/>
       </p:ext>
     </p:extLst>
   </p:cSld>
@@ -4299,7 +4297,7 @@
   <p:timing>
     <p:tnLst>
       <p:par>
-        <p:cTn xmlns:p14="http://schemas.microsoft.com/office/powerpoint/2010/main" id="1" dur="indefinite" restart="never" nodeType="tmRoot">
+        <p:cTn id="1" dur="indefinite" restart="never" nodeType="tmRoot">
           <p:childTnLst>
             <p:seq concurrent="1" nextAc="seek">
               <p:cTn id="2" dur="indefinite" nodeType="mainSeq">
@@ -4651,14 +4649,6 @@
               </a:rPr>
               <a:t>one-sentence description </a:t>
             </a:r>
-            <a:r>
-              <a:rPr lang="en-US" dirty="0" smtClean="0">
-                <a:solidFill>
-                  <a:srgbClr val="B23C00"/>
-                </a:solidFill>
-              </a:rPr>
-              <a:t/>
-            </a:r>
             <a:br>
               <a:rPr lang="en-US" dirty="0" smtClean="0">
                 <a:solidFill>
@@ -4668,11 +4658,7 @@
             </a:br>
             <a:r>
               <a:rPr lang="en-US" dirty="0" smtClean="0"/>
-              <a:t>of </a:t>
-            </a:r>
-            <a:r>
-              <a:rPr lang="en-US" dirty="0" smtClean="0"/>
-              <a:t>your imagined application, and </a:t>
+              <a:t>of your imagined application, and </a:t>
             </a:r>
           </a:p>
           <a:p>
@@ -4746,7 +4732,7 @@
     </p:spTree>
     <p:extLst>
       <p:ext uri="{BB962C8B-B14F-4D97-AF65-F5344CB8AC3E}">
-        <p14:creationId xmlns:p14="http://schemas.microsoft.com/office/powerpoint/2010/main" val="1887656176"/>
+        <p14:creationId xmlns:p14="http://schemas.microsoft.com/office/powerpoint/2010/main" xmlns="" val="1887656176"/>
       </p:ext>
     </p:extLst>
   </p:cSld>
@@ -4756,7 +4742,7 @@
   <p:timing>
     <p:tnLst>
       <p:par>
-        <p:cTn xmlns:p14="http://schemas.microsoft.com/office/powerpoint/2010/main" id="1" dur="indefinite" restart="never" nodeType="tmRoot"/>
+        <p:cTn id="1" dur="indefinite" restart="never" nodeType="tmRoot"/>
       </p:par>
     </p:tnLst>
   </p:timing>
@@ -4913,7 +4899,7 @@
     </p:spTree>
     <p:extLst>
       <p:ext uri="{BB962C8B-B14F-4D97-AF65-F5344CB8AC3E}">
-        <p14:creationId xmlns:p14="http://schemas.microsoft.com/office/powerpoint/2010/main" val="1168474300"/>
+        <p14:creationId xmlns:p14="http://schemas.microsoft.com/office/powerpoint/2010/main" xmlns="" val="1168474300"/>
       </p:ext>
     </p:extLst>
   </p:cSld>
@@ -4923,7 +4909,7 @@
   <p:timing>
     <p:tnLst>
       <p:par>
-        <p:cTn xmlns:p14="http://schemas.microsoft.com/office/powerpoint/2010/main" id="1" dur="indefinite" restart="never" nodeType="tmRoot">
+        <p:cTn id="1" dur="indefinite" restart="never" nodeType="tmRoot">
           <p:childTnLst>
             <p:seq concurrent="1" nextAc="seek">
               <p:cTn id="2" dur="indefinite" nodeType="mainSeq">
@@ -5287,7 +5273,7 @@
     </p:spTree>
     <p:extLst>
       <p:ext uri="{BB962C8B-B14F-4D97-AF65-F5344CB8AC3E}">
-        <p14:creationId xmlns:p14="http://schemas.microsoft.com/office/powerpoint/2010/main" val="2424060538"/>
+        <p14:creationId xmlns:p14="http://schemas.microsoft.com/office/powerpoint/2010/main" xmlns="" val="2424060538"/>
       </p:ext>
     </p:extLst>
   </p:cSld>
@@ -5297,7 +5283,7 @@
   <p:timing>
     <p:tnLst>
       <p:par>
-        <p:cTn xmlns:p14="http://schemas.microsoft.com/office/powerpoint/2010/main" id="1" dur="indefinite" restart="never" nodeType="tmRoot"/>
+        <p:cTn id="1" dur="indefinite" restart="never" nodeType="tmRoot"/>
       </p:par>
     </p:tnLst>
   </p:timing>
@@ -5395,7 +5381,7 @@
     </p:spTree>
     <p:extLst>
       <p:ext uri="{BB962C8B-B14F-4D97-AF65-F5344CB8AC3E}">
-        <p14:creationId xmlns:p14="http://schemas.microsoft.com/office/powerpoint/2010/main" val="1077628540"/>
+        <p14:creationId xmlns:p14="http://schemas.microsoft.com/office/powerpoint/2010/main" xmlns="" val="1077628540"/>
       </p:ext>
     </p:extLst>
   </p:cSld>
@@ -5405,7 +5391,7 @@
   <p:timing>
     <p:tnLst>
       <p:par>
-        <p:cTn xmlns:p14="http://schemas.microsoft.com/office/powerpoint/2010/main" id="1" dur="indefinite" restart="never" nodeType="tmRoot"/>
+        <p:cTn id="1" dur="indefinite" restart="never" nodeType="tmRoot"/>
       </p:par>
     </p:tnLst>
   </p:timing>
@@ -5493,11 +5479,7 @@
             </a:r>
             <a:r>
               <a:rPr lang="en-US" sz="2800" dirty="0" smtClean="0"/>
-              <a:t>a problem</a:t>
-            </a:r>
-            <a:r>
-              <a:rPr lang="en-US" sz="2800" dirty="0" smtClean="0"/>
-              <a:t>:</a:t>
+              <a:t>a problem:</a:t>
             </a:r>
           </a:p>
           <a:p>
@@ -5669,7 +5651,7 @@
     </p:spTree>
     <p:extLst>
       <p:ext uri="{BB962C8B-B14F-4D97-AF65-F5344CB8AC3E}">
-        <p14:creationId xmlns:p14="http://schemas.microsoft.com/office/powerpoint/2010/main" val="2062493585"/>
+        <p14:creationId xmlns:p14="http://schemas.microsoft.com/office/powerpoint/2010/main" xmlns="" val="2062493585"/>
       </p:ext>
     </p:extLst>
   </p:cSld>
@@ -5679,7 +5661,7 @@
   <p:timing>
     <p:tnLst>
       <p:par>
-        <p:cTn xmlns:p14="http://schemas.microsoft.com/office/powerpoint/2010/main" id="1" dur="indefinite" restart="never" nodeType="tmRoot">
+        <p:cTn id="1" dur="indefinite" restart="never" nodeType="tmRoot">
           <p:childTnLst>
             <p:seq concurrent="1" nextAc="seek">
               <p:cTn id="2" dur="indefinite" nodeType="mainSeq">
@@ -6028,7 +6010,7 @@
     </p:spTree>
     <p:extLst>
       <p:ext uri="{BB962C8B-B14F-4D97-AF65-F5344CB8AC3E}">
-        <p14:creationId xmlns:p14="http://schemas.microsoft.com/office/powerpoint/2010/main" val="2327515544"/>
+        <p14:creationId xmlns:p14="http://schemas.microsoft.com/office/powerpoint/2010/main" xmlns="" val="2327515544"/>
       </p:ext>
     </p:extLst>
   </p:cSld>
@@ -6038,7 +6020,7 @@
   <p:timing>
     <p:tnLst>
       <p:par>
-        <p:cTn xmlns:p14="http://schemas.microsoft.com/office/powerpoint/2010/main" id="1" dur="indefinite" restart="never" nodeType="tmRoot">
+        <p:cTn id="1" dur="indefinite" restart="never" nodeType="tmRoot">
           <p:childTnLst>
             <p:seq concurrent="1" nextAc="seek">
               <p:cTn id="2" dur="indefinite" nodeType="mainSeq">
@@ -6407,13 +6389,8 @@
             </a:pPr>
             <a:r>
               <a:rPr lang="en-US" dirty="0" smtClean="0"/>
-              <a:t>Why not</a:t>
-            </a:r>
-            <a:r>
-              <a:rPr lang="en-US" dirty="0" smtClean="0"/>
-              <a:t>?</a:t>
-            </a:r>
-            <a:endParaRPr lang="en-US" dirty="0" smtClean="0"/>
+              <a:t>Why not?</a:t>
+            </a:r>
           </a:p>
         </p:txBody>
       </p:sp>
@@ -6444,7 +6421,7 @@
     </p:spTree>
     <p:extLst>
       <p:ext uri="{BB962C8B-B14F-4D97-AF65-F5344CB8AC3E}">
-        <p14:creationId xmlns:p14="http://schemas.microsoft.com/office/powerpoint/2010/main" val="136226770"/>
+        <p14:creationId xmlns:p14="http://schemas.microsoft.com/office/powerpoint/2010/main" xmlns="" val="136226770"/>
       </p:ext>
     </p:extLst>
   </p:cSld>
@@ -6454,7 +6431,7 @@
   <p:timing>
     <p:tnLst>
       <p:par>
-        <p:cTn xmlns:p14="http://schemas.microsoft.com/office/powerpoint/2010/main" id="1" dur="indefinite" restart="never" nodeType="tmRoot">
+        <p:cTn id="1" dur="indefinite" restart="never" nodeType="tmRoot">
           <p:childTnLst>
             <p:seq concurrent="1" nextAc="seek">
               <p:cTn id="2" dur="indefinite" nodeType="mainSeq">
@@ -6621,15 +6598,13 @@
             </a:br>
             <a:r>
               <a:rPr lang="en-US" dirty="0" smtClean="0"/>
-              <a:t>already displayed?</a:t>
-            </a:r>
-            <a:br>
-              <a:rPr lang="en-US" dirty="0" smtClean="0"/>
-            </a:br>
-            <a:r>
-              <a:rPr lang="en-US" dirty="0" smtClean="0"/>
-              <a:t>_</a:t>
-            </a:r>
+              <a:t>already displayed</a:t>
+            </a:r>
+            <a:r>
+              <a:rPr lang="en-US" dirty="0" smtClean="0"/>
+              <a:t>?</a:t>
+            </a:r>
+            <a:endParaRPr lang="en-US" dirty="0" smtClean="0"/>
           </a:p>
         </p:txBody>
       </p:sp>
@@ -6660,7 +6635,7 @@
     </p:spTree>
     <p:extLst>
       <p:ext uri="{BB962C8B-B14F-4D97-AF65-F5344CB8AC3E}">
-        <p14:creationId xmlns:p14="http://schemas.microsoft.com/office/powerpoint/2010/main" val="870864566"/>
+        <p14:creationId xmlns:p14="http://schemas.microsoft.com/office/powerpoint/2010/main" xmlns="" val="870864566"/>
       </p:ext>
     </p:extLst>
   </p:cSld>
@@ -6670,7 +6645,7 @@
   <p:timing>
     <p:tnLst>
       <p:par>
-        <p:cTn xmlns:p14="http://schemas.microsoft.com/office/powerpoint/2010/main" id="1" dur="indefinite" restart="never" nodeType="tmRoot"/>
+        <p:cTn id="1" dur="indefinite" restart="never" nodeType="tmRoot"/>
       </p:par>
     </p:tnLst>
   </p:timing>
@@ -6834,7 +6809,7 @@
     </p:spTree>
     <p:extLst>
       <p:ext uri="{BB962C8B-B14F-4D97-AF65-F5344CB8AC3E}">
-        <p14:creationId xmlns:p14="http://schemas.microsoft.com/office/powerpoint/2010/main" val="598974350"/>
+        <p14:creationId xmlns:p14="http://schemas.microsoft.com/office/powerpoint/2010/main" xmlns="" val="598974350"/>
       </p:ext>
     </p:extLst>
   </p:cSld>
@@ -6844,7 +6819,7 @@
   <p:timing>
     <p:tnLst>
       <p:par>
-        <p:cTn xmlns:p14="http://schemas.microsoft.com/office/powerpoint/2010/main" id="1" dur="indefinite" restart="never" nodeType="tmRoot"/>
+        <p:cTn id="1" dur="indefinite" restart="never" nodeType="tmRoot"/>
       </p:par>
     </p:tnLst>
   </p:timing>
@@ -6967,28 +6942,31 @@
               <a:rPr lang="en-US" dirty="0" smtClean="0"/>
               <a:t>However, the software did not internally process the new character correctly but instead it </a:t>
             </a:r>
-            <a:br>
-              <a:rPr lang="en-US" dirty="0" smtClean="0"/>
-            </a:br>
             <a:r>
               <a:rPr lang="en-US" dirty="0" smtClean="0">
                 <a:solidFill>
                   <a:srgbClr val="B23C00"/>
                 </a:solidFill>
               </a:rPr>
-              <a:t>kept the old code </a:t>
-            </a:r>
-            <a:r>
-              <a:rPr lang="en-US" dirty="0" smtClean="0"/>
-              <a:t>in its buffer.</a:t>
-            </a:r>
-            <a:br>
-              <a:rPr lang="en-US" dirty="0" smtClean="0"/>
-            </a:br>
-            <a:r>
-              <a:rPr lang="en-US" dirty="0" smtClean="0"/>
-              <a:t>_</a:t>
-            </a:r>
+              <a:t>kept </a:t>
+            </a:r>
+            <a:r>
+              <a:rPr lang="en-US" dirty="0" smtClean="0">
+                <a:solidFill>
+                  <a:srgbClr val="B23C00"/>
+                </a:solidFill>
+              </a:rPr>
+              <a:t>the old code </a:t>
+            </a:r>
+            <a:r>
+              <a:rPr lang="en-US" dirty="0" smtClean="0"/>
+              <a:t>in its buffer</a:t>
+            </a:r>
+            <a:r>
+              <a:rPr lang="en-US" dirty="0" smtClean="0"/>
+              <a:t>.</a:t>
+            </a:r>
+            <a:endParaRPr lang="en-US" dirty="0" smtClean="0"/>
           </a:p>
         </p:txBody>
       </p:sp>
@@ -7019,7 +6997,7 @@
     </p:spTree>
     <p:extLst>
       <p:ext uri="{BB962C8B-B14F-4D97-AF65-F5344CB8AC3E}">
-        <p14:creationId xmlns:p14="http://schemas.microsoft.com/office/powerpoint/2010/main" val="1442037540"/>
+        <p14:creationId xmlns:p14="http://schemas.microsoft.com/office/powerpoint/2010/main" xmlns="" val="1442037540"/>
       </p:ext>
     </p:extLst>
   </p:cSld>
@@ -7029,7 +7007,7 @@
   <p:timing>
     <p:tnLst>
       <p:par>
-        <p:cTn xmlns:p14="http://schemas.microsoft.com/office/powerpoint/2010/main" id="1" dur="indefinite" restart="never" nodeType="tmRoot">
+        <p:cTn id="1" dur="indefinite" restart="never" nodeType="tmRoot">
           <p:childTnLst>
             <p:seq concurrent="1" nextAc="seek">
               <p:cTn id="2" dur="indefinite" nodeType="mainSeq">
@@ -7334,13 +7312,14 @@
               <a:rPr lang="en-US" dirty="0" smtClean="0"/>
               <a:t>that could have prevented these tragedies?</a:t>
             </a:r>
+            <a:r>
+              <a:rPr lang="en-US" smtClean="0"/>
+              <a:t/>
+            </a:r>
             <a:br>
-              <a:rPr lang="en-US" dirty="0" smtClean="0"/>
+              <a:rPr lang="en-US" smtClean="0"/>
             </a:br>
-            <a:r>
-              <a:rPr lang="en-US" dirty="0" smtClean="0"/>
-              <a:t>_</a:t>
-            </a:r>
+            <a:endParaRPr lang="en-US" dirty="0" smtClean="0"/>
           </a:p>
         </p:txBody>
       </p:sp>
@@ -7371,7 +7350,7 @@
     </p:spTree>
     <p:extLst>
       <p:ext uri="{BB962C8B-B14F-4D97-AF65-F5344CB8AC3E}">
-        <p14:creationId xmlns:p14="http://schemas.microsoft.com/office/powerpoint/2010/main" val="4256927343"/>
+        <p14:creationId xmlns:p14="http://schemas.microsoft.com/office/powerpoint/2010/main" xmlns="" val="4256927343"/>
       </p:ext>
     </p:extLst>
   </p:cSld>
@@ -7381,7 +7360,7 @@
   <p:timing>
     <p:tnLst>
       <p:par>
-        <p:cTn xmlns:p14="http://schemas.microsoft.com/office/powerpoint/2010/main" id="1" dur="indefinite" restart="never" nodeType="tmRoot">
+        <p:cTn id="1" dur="indefinite" restart="never" nodeType="tmRoot">
           <p:childTnLst>
             <p:seq concurrent="1" nextAc="seek">
               <p:cTn id="2" dur="indefinite" nodeType="mainSeq">
@@ -7602,7 +7581,7 @@
     </p:spTree>
     <p:extLst>
       <p:ext uri="{BB962C8B-B14F-4D97-AF65-F5344CB8AC3E}">
-        <p14:creationId xmlns:p14="http://schemas.microsoft.com/office/powerpoint/2010/main" val="1817373222"/>
+        <p14:creationId xmlns:p14="http://schemas.microsoft.com/office/powerpoint/2010/main" xmlns="" val="1817373222"/>
       </p:ext>
     </p:extLst>
   </p:cSld>
@@ -7612,7 +7591,7 @@
   <p:timing>
     <p:tnLst>
       <p:par>
-        <p:cTn xmlns:p14="http://schemas.microsoft.com/office/powerpoint/2010/main" id="1" dur="indefinite" restart="never" nodeType="tmRoot">
+        <p:cTn id="1" dur="indefinite" restart="never" nodeType="tmRoot">
           <p:childTnLst>
             <p:seq concurrent="1" nextAc="seek">
               <p:cTn id="2" dur="indefinite" nodeType="mainSeq">
@@ -7840,7 +7819,7 @@
     </p:spTree>
     <p:extLst>
       <p:ext uri="{BB962C8B-B14F-4D97-AF65-F5344CB8AC3E}">
-        <p14:creationId xmlns:p14="http://schemas.microsoft.com/office/powerpoint/2010/main" val="3549645359"/>
+        <p14:creationId xmlns:p14="http://schemas.microsoft.com/office/powerpoint/2010/main" xmlns="" val="3549645359"/>
       </p:ext>
     </p:extLst>
   </p:cSld>
@@ -7850,7 +7829,7 @@
   <p:timing>
     <p:tnLst>
       <p:par>
-        <p:cTn xmlns:p14="http://schemas.microsoft.com/office/powerpoint/2010/main" id="1" dur="indefinite" restart="never" nodeType="tmRoot">
+        <p:cTn id="1" dur="indefinite" restart="never" nodeType="tmRoot">
           <p:childTnLst>
             <p:seq concurrent="1" nextAc="seek">
               <p:cTn id="2" dur="indefinite" nodeType="mainSeq">
@@ -8045,7 +8024,7 @@
     </p:spTree>
     <p:extLst>
       <p:ext uri="{BB962C8B-B14F-4D97-AF65-F5344CB8AC3E}">
-        <p14:creationId xmlns:p14="http://schemas.microsoft.com/office/powerpoint/2010/main" val="2516639398"/>
+        <p14:creationId xmlns:p14="http://schemas.microsoft.com/office/powerpoint/2010/main" xmlns="" val="2516639398"/>
       </p:ext>
     </p:extLst>
   </p:cSld>
@@ -8055,7 +8034,7 @@
   <p:timing>
     <p:tnLst>
       <p:par>
-        <p:cTn xmlns:p14="http://schemas.microsoft.com/office/powerpoint/2010/main" id="1" dur="indefinite" restart="never" nodeType="tmRoot"/>
+        <p:cTn id="1" dur="indefinite" restart="never" nodeType="tmRoot"/>
       </p:par>
     </p:tnLst>
   </p:timing>
@@ -8181,17 +8160,8 @@
             </a:r>
             <a:r>
               <a:rPr lang="en-US" dirty="0" smtClean="0"/>
-              <a:t> way </a:t>
-            </a:r>
-            <a:r>
-              <a:rPr lang="en-US" dirty="0" smtClean="0"/>
-              <a:t>to the </a:t>
-            </a:r>
-            <a:r>
-              <a:rPr lang="en-US" dirty="0" smtClean="0"/>
-              <a:t>user.</a:t>
-            </a:r>
-            <a:endParaRPr lang="en-US" dirty="0" smtClean="0"/>
+              <a:t> way to the user.</a:t>
+            </a:r>
           </a:p>
           <a:p>
             <a:pPr lvl="6"/>
@@ -8257,7 +8227,7 @@
     </p:spTree>
     <p:extLst>
       <p:ext uri="{BB962C8B-B14F-4D97-AF65-F5344CB8AC3E}">
-        <p14:creationId xmlns:p14="http://schemas.microsoft.com/office/powerpoint/2010/main" val="618036872"/>
+        <p14:creationId xmlns:p14="http://schemas.microsoft.com/office/powerpoint/2010/main" xmlns="" val="618036872"/>
       </p:ext>
     </p:extLst>
   </p:cSld>
@@ -8267,7 +8237,7 @@
   <p:timing>
     <p:tnLst>
       <p:par>
-        <p:cTn xmlns:p14="http://schemas.microsoft.com/office/powerpoint/2010/main" id="1" dur="indefinite" restart="never" nodeType="tmRoot">
+        <p:cTn id="1" dur="indefinite" restart="never" nodeType="tmRoot">
           <p:childTnLst>
             <p:seq concurrent="1" nextAc="seek">
               <p:cTn id="2" dur="indefinite" nodeType="mainSeq">
@@ -8435,11 +8405,7 @@
           <a:p>
             <a:r>
               <a:rPr lang="en-US" dirty="0" smtClean="0"/>
-              <a:t>Reminders: By </a:t>
-            </a:r>
-            <a:r>
-              <a:rPr lang="en-US" dirty="0" smtClean="0"/>
-              <a:t>Monday, January 26</a:t>
+              <a:t>Reminders: By Monday, January 26</a:t>
             </a:r>
             <a:endParaRPr lang="en-US" dirty="0"/>
           </a:p>
@@ -8515,15 +8481,7 @@
                   <a:srgbClr val="B23C00"/>
                 </a:solidFill>
               </a:rPr>
-              <a:t>imagined </a:t>
-            </a:r>
-            <a:r>
-              <a:rPr lang="en-US" dirty="0" smtClean="0">
-                <a:solidFill>
-                  <a:srgbClr val="B23C00"/>
-                </a:solidFill>
-              </a:rPr>
-              <a:t>web application</a:t>
+              <a:t>imagined web application</a:t>
             </a:r>
             <a:r>
               <a:rPr lang="en-US" dirty="0" smtClean="0"/>
@@ -8581,7 +8539,7 @@
     </p:spTree>
     <p:extLst>
       <p:ext uri="{BB962C8B-B14F-4D97-AF65-F5344CB8AC3E}">
-        <p14:creationId xmlns:p14="http://schemas.microsoft.com/office/powerpoint/2010/main" val="2230909407"/>
+        <p14:creationId xmlns:p14="http://schemas.microsoft.com/office/powerpoint/2010/main" xmlns="" val="2230909407"/>
       </p:ext>
     </p:extLst>
   </p:cSld>
@@ -8591,7 +8549,7 @@
   <p:timing>
     <p:tnLst>
       <p:par>
-        <p:cTn xmlns:p14="http://schemas.microsoft.com/office/powerpoint/2010/main" id="1" dur="indefinite" restart="never" nodeType="tmRoot"/>
+        <p:cTn id="1" dur="indefinite" restart="never" nodeType="tmRoot"/>
       </p:par>
     </p:tnLst>
   </p:timing>
@@ -8690,11 +8648,7 @@
             <a:pPr lvl="1"/>
             <a:r>
               <a:rPr lang="en-US" dirty="0" smtClean="0"/>
-              <a:t>Web </a:t>
-            </a:r>
-            <a:r>
-              <a:rPr lang="en-US" dirty="0" smtClean="0"/>
-              <a:t>applications</a:t>
+              <a:t>Web applications</a:t>
             </a:r>
           </a:p>
           <a:p>
@@ -8720,11 +8674,7 @@
             <a:pPr lvl="1"/>
             <a:r>
               <a:rPr lang="en-US" dirty="0" smtClean="0"/>
-              <a:t>UI </a:t>
-            </a:r>
-            <a:r>
-              <a:rPr lang="en-US" dirty="0" smtClean="0"/>
-              <a:t>evaluation</a:t>
+              <a:t>UI evaluation</a:t>
             </a:r>
           </a:p>
           <a:p>
@@ -8784,7 +8734,7 @@
   <p:timing>
     <p:tnLst>
       <p:par>
-        <p:cTn xmlns:p14="http://schemas.microsoft.com/office/powerpoint/2010/main" id="1" dur="indefinite" restart="never" nodeType="tmRoot">
+        <p:cTn id="1" dur="indefinite" restart="never" nodeType="tmRoot">
           <p:childTnLst>
             <p:seq concurrent="1" nextAc="seek">
               <p:cTn id="2" dur="indefinite" nodeType="mainSeq">
@@ -9123,11 +9073,7 @@
           <a:p>
             <a:r>
               <a:rPr lang="en-US" dirty="0" smtClean="0"/>
-              <a:t>Your application only has to “work” well enough to demonstrate its user interface</a:t>
-            </a:r>
-            <a:r>
-              <a:rPr lang="en-US" dirty="0" smtClean="0"/>
-              <a:t>.</a:t>
+              <a:t>Your application only has to “work” well enough to demonstrate its user interface.</a:t>
             </a:r>
           </a:p>
           <a:p>
@@ -9154,7 +9100,6 @@
               <a:rPr lang="en-US" dirty="0" smtClean="0"/>
               <a:t>.</a:t>
             </a:r>
-            <a:endParaRPr lang="en-US" dirty="0" smtClean="0"/>
           </a:p>
         </p:txBody>
       </p:sp>
@@ -9185,7 +9130,7 @@
     </p:spTree>
     <p:extLst>
       <p:ext uri="{BB962C8B-B14F-4D97-AF65-F5344CB8AC3E}">
-        <p14:creationId xmlns:p14="http://schemas.microsoft.com/office/powerpoint/2010/main" val="3392528693"/>
+        <p14:creationId xmlns:p14="http://schemas.microsoft.com/office/powerpoint/2010/main" xmlns="" val="3392528693"/>
       </p:ext>
     </p:extLst>
   </p:cSld>
@@ -9195,7 +9140,7 @@
   <p:timing>
     <p:tnLst>
       <p:par>
-        <p:cTn xmlns:p14="http://schemas.microsoft.com/office/powerpoint/2010/main" id="1" dur="indefinite" restart="never" nodeType="tmRoot">
+        <p:cTn id="1" dur="indefinite" restart="never" nodeType="tmRoot">
           <p:childTnLst>
             <p:seq concurrent="1" nextAc="seek">
               <p:cTn id="2" dur="indefinite" nodeType="mainSeq">
@@ -9492,7 +9437,7 @@
   <p:timing>
     <p:tnLst>
       <p:par>
-        <p:cTn xmlns:p14="http://schemas.microsoft.com/office/powerpoint/2010/main" id="1" dur="indefinite" restart="never" nodeType="tmRoot">
+        <p:cTn id="1" dur="indefinite" restart="never" nodeType="tmRoot">
           <p:childTnLst>
             <p:seq concurrent="1" nextAc="seek">
               <p:cTn id="2" dur="indefinite" nodeType="mainSeq">
@@ -9840,7 +9785,6 @@
               <a:rPr lang="en-US" dirty="0" smtClean="0"/>
               <a:t>:</a:t>
             </a:r>
-            <a:endParaRPr lang="en-US" dirty="0" smtClean="0"/>
           </a:p>
           <a:p>
             <a:pPr lvl="7"/>
@@ -9914,14 +9858,7 @@
                 <a:latin typeface="Courier New"/>
                 <a:cs typeface="Courier New"/>
               </a:rPr>
-              <a:t>CS </a:t>
-            </a:r>
-            <a:r>
-              <a:rPr lang="en-US" b="1" dirty="0" smtClean="0">
-                <a:latin typeface="Courier New"/>
-                <a:cs typeface="Courier New"/>
-              </a:rPr>
-              <a:t>235</a:t>
+              <a:t>CS 235</a:t>
             </a:r>
             <a:r>
               <a:rPr lang="en-US" i="1" dirty="0" smtClean="0">
@@ -9957,32 +9894,14 @@
             <a:pPr lvl="1"/>
             <a:r>
               <a:rPr lang="en-US" dirty="0" smtClean="0"/>
-              <a:t>Example</a:t>
-            </a:r>
-            <a:r>
-              <a:rPr lang="en-US" dirty="0" smtClean="0"/>
-              <a:t>: </a:t>
+              <a:t>Example: </a:t>
             </a:r>
             <a:r>
               <a:rPr lang="en-US" b="1" dirty="0" smtClean="0">
                 <a:latin typeface="Courier New"/>
                 <a:cs typeface="Courier New"/>
               </a:rPr>
-              <a:t>CS </a:t>
-            </a:r>
-            <a:r>
-              <a:rPr lang="en-US" b="1" dirty="0" smtClean="0">
-                <a:latin typeface="Courier New"/>
-                <a:cs typeface="Courier New"/>
-              </a:rPr>
-              <a:t>235 </a:t>
-            </a:r>
-            <a:r>
-              <a:rPr lang="en-US" b="1" dirty="0" smtClean="0">
-                <a:latin typeface="Courier New"/>
-                <a:cs typeface="Courier New"/>
-              </a:rPr>
-              <a:t>Team Super Coders</a:t>
+              <a:t>CS 235 Team Super Coders</a:t>
             </a:r>
             <a:endParaRPr lang="en-US" b="1" dirty="0">
               <a:latin typeface="Courier New"/>
@@ -10018,7 +9937,7 @@
     </p:spTree>
     <p:extLst>
       <p:ext uri="{BB962C8B-B14F-4D97-AF65-F5344CB8AC3E}">
-        <p14:creationId xmlns:p14="http://schemas.microsoft.com/office/powerpoint/2010/main" val="3682917370"/>
+        <p14:creationId xmlns:p14="http://schemas.microsoft.com/office/powerpoint/2010/main" xmlns="" val="3682917370"/>
       </p:ext>
     </p:extLst>
   </p:cSld>
@@ -10028,7 +9947,7 @@
   <p:timing>
     <p:tnLst>
       <p:par>
-        <p:cTn xmlns:p14="http://schemas.microsoft.com/office/powerpoint/2010/main" id="1" dur="indefinite" restart="never" nodeType="tmRoot">
+        <p:cTn id="1" dur="indefinite" restart="never" nodeType="tmRoot">
           <p:childTnLst>
             <p:seq concurrent="1" nextAc="seek">
               <p:cTn id="2" dur="indefinite" nodeType="mainSeq">
@@ -10405,7 +10324,7 @@
           <a:effectLst/>
           <a:extLst>
             <a:ext uri="{AF507438-7753-43e0-B8FC-AC1667EBCBE1}">
-              <a14:hiddenEffects xmlns:a14="http://schemas.microsoft.com/office/drawing/2010/main">
+              <a14:hiddenEffects xmlns:a14="http://schemas.microsoft.com/office/drawing/2010/main" xmlns="">
                 <a:effectLst>
                   <a:outerShdw blurRad="63500" dist="38099" dir="2700000" algn="ctr" rotWithShape="0">
                     <a:schemeClr val="bg2">
@@ -10627,7 +10546,7 @@
   <p:timing>
     <p:tnLst>
       <p:par>
-        <p:cTn xmlns:p14="http://schemas.microsoft.com/office/powerpoint/2010/main" id="1" dur="indefinite" restart="never" nodeType="tmRoot">
+        <p:cTn id="1" dur="indefinite" restart="never" nodeType="tmRoot">
           <p:childTnLst>
             <p:seq concurrent="1" nextAc="seek">
               <p:cTn id="2" dur="indefinite" nodeType="mainSeq">
@@ -10970,7 +10889,7 @@
   <p:timing>
     <p:tnLst>
       <p:par>
-        <p:cTn xmlns:p14="http://schemas.microsoft.com/office/powerpoint/2010/main" id="1" dur="indefinite" restart="never" nodeType="tmRoot">
+        <p:cTn id="1" dur="indefinite" restart="never" nodeType="tmRoot">
           <p:childTnLst>
             <p:seq concurrent="1" nextAc="seek">
               <p:cTn id="2" dur="indefinite" nodeType="mainSeq">
@@ -11261,15 +11180,7 @@
                   <a:srgbClr val="B23C00"/>
                 </a:solidFill>
               </a:rPr>
-              <a:t>design </a:t>
-            </a:r>
-            <a:r>
-              <a:rPr lang="en-US" dirty="0" smtClean="0">
-                <a:solidFill>
-                  <a:srgbClr val="B23C00"/>
-                </a:solidFill>
-              </a:rPr>
-              <a:t>assignments </a:t>
+              <a:t>design assignments </a:t>
             </a:r>
             <a:r>
               <a:rPr lang="en-US" dirty="0" smtClean="0"/>
@@ -11415,7 +11326,7 @@
   <p:timing>
     <p:tnLst>
       <p:par>
-        <p:cTn xmlns:p14="http://schemas.microsoft.com/office/powerpoint/2010/main" id="1" dur="indefinite" restart="never" nodeType="tmRoot"/>
+        <p:cTn id="1" dur="indefinite" restart="never" nodeType="tmRoot"/>
       </p:par>
     </p:tnLst>
   </p:timing>
@@ -11668,7 +11579,7 @@
         <a:effectLst/>
         <a:extLst>
           <a:ext uri="{AF507438-7753-43e0-B8FC-AC1667EBCBE1}">
-            <a14:hiddenEffects xmlns:a14="http://schemas.microsoft.com/office/drawing/2010/main">
+            <a14:hiddenEffects xmlns:a14="http://schemas.microsoft.com/office/drawing/2010/main" xmlns="">
               <a:effectLst>
                 <a:outerShdw blurRad="63500" dist="38099" dir="2700000" algn="ctr" rotWithShape="0">
                   <a:schemeClr val="bg2">
@@ -11744,7 +11655,7 @@
         <a:effectLst/>
         <a:extLst>
           <a:ext uri="{AF507438-7753-43e0-B8FC-AC1667EBCBE1}">
-            <a14:hiddenEffects xmlns:a14="http://schemas.microsoft.com/office/drawing/2010/main">
+            <a14:hiddenEffects xmlns:a14="http://schemas.microsoft.com/office/drawing/2010/main" xmlns="">
               <a:effectLst>
                 <a:outerShdw blurRad="63500" dist="38099" dir="2700000" algn="ctr" rotWithShape="0">
                   <a:schemeClr val="bg2">

</xml_diff>